<commit_message>
Update G2M insight for Cab Investment firm.pptx
</commit_message>
<xml_diff>
--- a/G2M insight for Cab Investment firm.pptx
+++ b/G2M insight for Cab Investment firm.pptx
@@ -2459,7 +2459,7 @@
           <a:p>
             <a:fld id="{A6366E3F-7025-4FC3-8F82-44B31406DC02}" type="datetimeFigureOut">
               <a:rPr lang="en-KE" smtClean="0"/>
-              <a:t>08/05/2024</a:t>
+              <a:t>14/05/2024</a:t>
             </a:fld>
             <a:endParaRPr lang="en-KE"/>
           </a:p>
@@ -2659,7 +2659,7 @@
           <a:p>
             <a:fld id="{A6366E3F-7025-4FC3-8F82-44B31406DC02}" type="datetimeFigureOut">
               <a:rPr lang="en-KE" smtClean="0"/>
-              <a:t>08/05/2024</a:t>
+              <a:t>14/05/2024</a:t>
             </a:fld>
             <a:endParaRPr lang="en-KE"/>
           </a:p>
@@ -2869,7 +2869,7 @@
           <a:p>
             <a:fld id="{A6366E3F-7025-4FC3-8F82-44B31406DC02}" type="datetimeFigureOut">
               <a:rPr lang="en-KE" smtClean="0"/>
-              <a:t>08/05/2024</a:t>
+              <a:t>14/05/2024</a:t>
             </a:fld>
             <a:endParaRPr lang="en-KE"/>
           </a:p>
@@ -3069,7 +3069,7 @@
           <a:p>
             <a:fld id="{A6366E3F-7025-4FC3-8F82-44B31406DC02}" type="datetimeFigureOut">
               <a:rPr lang="en-KE" smtClean="0"/>
-              <a:t>08/05/2024</a:t>
+              <a:t>14/05/2024</a:t>
             </a:fld>
             <a:endParaRPr lang="en-KE"/>
           </a:p>
@@ -3345,7 +3345,7 @@
           <a:p>
             <a:fld id="{A6366E3F-7025-4FC3-8F82-44B31406DC02}" type="datetimeFigureOut">
               <a:rPr lang="en-KE" smtClean="0"/>
-              <a:t>08/05/2024</a:t>
+              <a:t>14/05/2024</a:t>
             </a:fld>
             <a:endParaRPr lang="en-KE"/>
           </a:p>
@@ -3613,7 +3613,7 @@
           <a:p>
             <a:fld id="{A6366E3F-7025-4FC3-8F82-44B31406DC02}" type="datetimeFigureOut">
               <a:rPr lang="en-KE" smtClean="0"/>
-              <a:t>08/05/2024</a:t>
+              <a:t>14/05/2024</a:t>
             </a:fld>
             <a:endParaRPr lang="en-KE"/>
           </a:p>
@@ -4028,7 +4028,7 @@
           <a:p>
             <a:fld id="{A6366E3F-7025-4FC3-8F82-44B31406DC02}" type="datetimeFigureOut">
               <a:rPr lang="en-KE" smtClean="0"/>
-              <a:t>08/05/2024</a:t>
+              <a:t>14/05/2024</a:t>
             </a:fld>
             <a:endParaRPr lang="en-KE"/>
           </a:p>
@@ -4170,7 +4170,7 @@
           <a:p>
             <a:fld id="{A6366E3F-7025-4FC3-8F82-44B31406DC02}" type="datetimeFigureOut">
               <a:rPr lang="en-KE" smtClean="0"/>
-              <a:t>08/05/2024</a:t>
+              <a:t>14/05/2024</a:t>
             </a:fld>
             <a:endParaRPr lang="en-KE"/>
           </a:p>
@@ -4283,7 +4283,7 @@
           <a:p>
             <a:fld id="{A6366E3F-7025-4FC3-8F82-44B31406DC02}" type="datetimeFigureOut">
               <a:rPr lang="en-KE" smtClean="0"/>
-              <a:t>08/05/2024</a:t>
+              <a:t>14/05/2024</a:t>
             </a:fld>
             <a:endParaRPr lang="en-KE"/>
           </a:p>
@@ -4596,7 +4596,7 @@
           <a:p>
             <a:fld id="{A6366E3F-7025-4FC3-8F82-44B31406DC02}" type="datetimeFigureOut">
               <a:rPr lang="en-KE" smtClean="0"/>
-              <a:t>08/05/2024</a:t>
+              <a:t>14/05/2024</a:t>
             </a:fld>
             <a:endParaRPr lang="en-KE"/>
           </a:p>
@@ -4885,7 +4885,7 @@
           <a:p>
             <a:fld id="{A6366E3F-7025-4FC3-8F82-44B31406DC02}" type="datetimeFigureOut">
               <a:rPr lang="en-KE" smtClean="0"/>
-              <a:t>08/05/2024</a:t>
+              <a:t>14/05/2024</a:t>
             </a:fld>
             <a:endParaRPr lang="en-KE"/>
           </a:p>
@@ -5128,7 +5128,7 @@
           <a:p>
             <a:fld id="{A6366E3F-7025-4FC3-8F82-44B31406DC02}" type="datetimeFigureOut">
               <a:rPr lang="en-KE" smtClean="0"/>
-              <a:t>08/05/2024</a:t>
+              <a:t>14/05/2024</a:t>
             </a:fld>
             <a:endParaRPr lang="en-KE"/>
           </a:p>
@@ -12841,7 +12841,7 @@
           <p:nvPr>
             <p:extLst>
               <p:ext uri="{D42A27DB-BD31-4B8C-83A1-F6EECF244321}">
-                <p14:modId xmlns:p14="http://schemas.microsoft.com/office/powerpoint/2010/main" val="2224071474"/>
+                <p14:modId xmlns:p14="http://schemas.microsoft.com/office/powerpoint/2010/main" val="432856487"/>
               </p:ext>
             </p:extLst>
           </p:nvPr>
@@ -12918,7 +12918,15 @@
                     <a:bodyPr/>
                     <a:lstStyle/>
                     <a:p>
-                      <a:endParaRPr lang="en-KE" sz="3900" b="1" cap="none" spc="0">
+                      <a:r>
+                        <a:rPr lang="en-US" sz="3900" b="1" cap="none" spc="0" dirty="0">
+                          <a:solidFill>
+                            <a:schemeClr val="bg1"/>
+                          </a:solidFill>
+                        </a:rPr>
+                        <a:t>2040</a:t>
+                      </a:r>
+                      <a:endParaRPr lang="en-KE" sz="3900" b="1" cap="none" spc="0" dirty="0">
                         <a:solidFill>
                           <a:schemeClr val="bg1"/>
                         </a:solidFill>
@@ -12957,14 +12965,14 @@
                     <a:lstStyle/>
                     <a:p>
                       <a:r>
-                        <a:rPr lang="en-US" sz="3300" cap="none" spc="0">
+                        <a:rPr lang="en-US" sz="3300" cap="none" spc="0" dirty="0">
                           <a:solidFill>
                             <a:schemeClr val="tx1"/>
                           </a:solidFill>
                         </a:rPr>
                         <a:t>Total number of features</a:t>
                       </a:r>
-                      <a:endParaRPr lang="en-KE" sz="3300" cap="none" spc="0">
+                      <a:endParaRPr lang="en-KE" sz="3300" cap="none" spc="0" dirty="0">
                         <a:solidFill>
                           <a:schemeClr val="tx1"/>
                         </a:solidFill>
@@ -12997,7 +13005,15 @@
                     <a:bodyPr/>
                     <a:lstStyle/>
                     <a:p>
-                      <a:endParaRPr lang="en-KE" sz="3300" cap="none" spc="0">
+                      <a:r>
+                        <a:rPr lang="en-US" sz="3300" cap="none" spc="0" dirty="0">
+                          <a:solidFill>
+                            <a:schemeClr val="tx1"/>
+                          </a:solidFill>
+                        </a:rPr>
+                        <a:t>4</a:t>
+                      </a:r>
+                      <a:endParaRPr lang="en-KE" sz="3300" cap="none" spc="0" dirty="0">
                         <a:solidFill>
                           <a:schemeClr val="tx1"/>
                         </a:solidFill>
@@ -13038,14 +13054,14 @@
                     <a:lstStyle/>
                     <a:p>
                       <a:r>
-                        <a:rPr lang="en-US" sz="3300" cap="none" spc="0">
+                        <a:rPr lang="en-US" sz="3300" cap="none" spc="0" dirty="0">
                           <a:solidFill>
                             <a:schemeClr val="tx1"/>
                           </a:solidFill>
                         </a:rPr>
                         <a:t>Base format of the file</a:t>
                       </a:r>
-                      <a:endParaRPr lang="en-KE" sz="3300" cap="none" spc="0">
+                      <a:endParaRPr lang="en-KE" sz="3300" cap="none" spc="0" dirty="0">
                         <a:solidFill>
                           <a:schemeClr val="tx1"/>
                         </a:solidFill>
@@ -13083,7 +13099,15 @@
                     <a:bodyPr/>
                     <a:lstStyle/>
                     <a:p>
-                      <a:endParaRPr lang="en-KE" sz="3300" cap="none" spc="0">
+                      <a:r>
+                        <a:rPr lang="en-US" sz="3300" cap="none" spc="0" dirty="0">
+                          <a:solidFill>
+                            <a:schemeClr val="tx1"/>
+                          </a:solidFill>
+                        </a:rPr>
+                        <a:t>.csv</a:t>
+                      </a:r>
+                      <a:endParaRPr lang="en-KE" sz="3300" cap="none" spc="0" dirty="0">
                         <a:solidFill>
                           <a:schemeClr val="tx1"/>
                         </a:solidFill>
@@ -13168,7 +13192,15 @@
                     <a:bodyPr/>
                     <a:lstStyle/>
                     <a:p>
-                      <a:endParaRPr lang="en-KE" sz="3300" cap="none" spc="0">
+                      <a:r>
+                        <a:rPr lang="en-US" sz="3300" cap="none" spc="0">
+                          <a:solidFill>
+                            <a:schemeClr val="tx1"/>
+                          </a:solidFill>
+                        </a:rPr>
+                        <a:t>1200KB</a:t>
+                      </a:r>
+                      <a:endParaRPr lang="en-KE" sz="3300" cap="none" spc="0" dirty="0">
                         <a:solidFill>
                           <a:schemeClr val="tx1"/>
                         </a:solidFill>

</xml_diff>